<commit_message>
updated customer policies with a new button
</commit_message>
<xml_diff>
--- a/ActiveNet Trainer/Courses/ActiveNet Orientation - Customers/Customers Policy and Procedures.pptx
+++ b/ActiveNet Trainer/Courses/ActiveNet Orientation - Customers/Customers Policy and Procedures.pptx
@@ -4608,6 +4608,161 @@
           </p:txBody>
         </p:sp>
       </p:grpSp>
+      <p:sp>
+        <p:nvSpPr>
+          <p:cNvPr id="20" name="Rounded Rectangle 19">
+            <a:hlinkClick r:id="rId5" action="ppaction://hlinksldjump"/>
+          </p:cNvPr>
+          <p:cNvSpPr/>
+          <p:nvPr/>
+        </p:nvSpPr>
+        <p:spPr>
+          <a:xfrm>
+            <a:off x="3950208" y="5989320"/>
+            <a:ext cx="1230482" cy="457999"/>
+          </a:xfrm>
+          <a:prstGeom prst="roundRect">
+            <a:avLst/>
+          </a:prstGeom>
+          <a:solidFill>
+            <a:srgbClr val="195896"/>
+          </a:solidFill>
+          <a:ln w="28575">
+            <a:solidFill>
+              <a:srgbClr val="FFE374"/>
+            </a:solidFill>
+          </a:ln>
+          <a:effectLst>
+            <a:outerShdw blurRad="50800" dist="25400" dir="5400000" algn="ctr" rotWithShape="0">
+              <a:schemeClr val="tx2">
+                <a:lumMod val="75000"/>
+              </a:schemeClr>
+            </a:outerShdw>
+          </a:effectLst>
+        </p:spPr>
+        <p:style>
+          <a:lnRef idx="2">
+            <a:schemeClr val="accent1">
+              <a:shade val="50000"/>
+            </a:schemeClr>
+          </a:lnRef>
+          <a:fillRef idx="1">
+            <a:schemeClr val="accent1"/>
+          </a:fillRef>
+          <a:effectRef idx="0">
+            <a:schemeClr val="accent1"/>
+          </a:effectRef>
+          <a:fontRef idx="minor">
+            <a:schemeClr val="lt1"/>
+          </a:fontRef>
+        </p:style>
+        <p:txBody>
+          <a:bodyPr rtlCol="0" anchor="ctr"/>
+          <a:lstStyle>
+            <a:defPPr>
+              <a:defRPr lang="en-US"/>
+            </a:defPPr>
+            <a:lvl1pPr marL="0" algn="l" defTabSz="914400" rtl="0" eaLnBrk="1" latinLnBrk="0" hangingPunct="1">
+              <a:defRPr sz="1800" kern="1200">
+                <a:solidFill>
+                  <a:schemeClr val="lt1"/>
+                </a:solidFill>
+                <a:latin typeface="+mn-lt"/>
+                <a:ea typeface="+mn-ea"/>
+                <a:cs typeface="+mn-cs"/>
+              </a:defRPr>
+            </a:lvl1pPr>
+            <a:lvl2pPr marL="457200" algn="l" defTabSz="914400" rtl="0" eaLnBrk="1" latinLnBrk="0" hangingPunct="1">
+              <a:defRPr sz="1800" kern="1200">
+                <a:solidFill>
+                  <a:schemeClr val="lt1"/>
+                </a:solidFill>
+                <a:latin typeface="+mn-lt"/>
+                <a:ea typeface="+mn-ea"/>
+                <a:cs typeface="+mn-cs"/>
+              </a:defRPr>
+            </a:lvl2pPr>
+            <a:lvl3pPr marL="914400" algn="l" defTabSz="914400" rtl="0" eaLnBrk="1" latinLnBrk="0" hangingPunct="1">
+              <a:defRPr sz="1800" kern="1200">
+                <a:solidFill>
+                  <a:schemeClr val="lt1"/>
+                </a:solidFill>
+                <a:latin typeface="+mn-lt"/>
+                <a:ea typeface="+mn-ea"/>
+                <a:cs typeface="+mn-cs"/>
+              </a:defRPr>
+            </a:lvl3pPr>
+            <a:lvl4pPr marL="1371600" algn="l" defTabSz="914400" rtl="0" eaLnBrk="1" latinLnBrk="0" hangingPunct="1">
+              <a:defRPr sz="1800" kern="1200">
+                <a:solidFill>
+                  <a:schemeClr val="lt1"/>
+                </a:solidFill>
+                <a:latin typeface="+mn-lt"/>
+                <a:ea typeface="+mn-ea"/>
+                <a:cs typeface="+mn-cs"/>
+              </a:defRPr>
+            </a:lvl4pPr>
+            <a:lvl5pPr marL="1828800" algn="l" defTabSz="914400" rtl="0" eaLnBrk="1" latinLnBrk="0" hangingPunct="1">
+              <a:defRPr sz="1800" kern="1200">
+                <a:solidFill>
+                  <a:schemeClr val="lt1"/>
+                </a:solidFill>
+                <a:latin typeface="+mn-lt"/>
+                <a:ea typeface="+mn-ea"/>
+                <a:cs typeface="+mn-cs"/>
+              </a:defRPr>
+            </a:lvl5pPr>
+            <a:lvl6pPr marL="2286000" algn="l" defTabSz="914400" rtl="0" eaLnBrk="1" latinLnBrk="0" hangingPunct="1">
+              <a:defRPr sz="1800" kern="1200">
+                <a:solidFill>
+                  <a:schemeClr val="lt1"/>
+                </a:solidFill>
+                <a:latin typeface="+mn-lt"/>
+                <a:ea typeface="+mn-ea"/>
+                <a:cs typeface="+mn-cs"/>
+              </a:defRPr>
+            </a:lvl6pPr>
+            <a:lvl7pPr marL="2743200" algn="l" defTabSz="914400" rtl="0" eaLnBrk="1" latinLnBrk="0" hangingPunct="1">
+              <a:defRPr sz="1800" kern="1200">
+                <a:solidFill>
+                  <a:schemeClr val="lt1"/>
+                </a:solidFill>
+                <a:latin typeface="+mn-lt"/>
+                <a:ea typeface="+mn-ea"/>
+                <a:cs typeface="+mn-cs"/>
+              </a:defRPr>
+            </a:lvl7pPr>
+            <a:lvl8pPr marL="3200400" algn="l" defTabSz="914400" rtl="0" eaLnBrk="1" latinLnBrk="0" hangingPunct="1">
+              <a:defRPr sz="1800" kern="1200">
+                <a:solidFill>
+                  <a:schemeClr val="lt1"/>
+                </a:solidFill>
+                <a:latin typeface="+mn-lt"/>
+                <a:ea typeface="+mn-ea"/>
+                <a:cs typeface="+mn-cs"/>
+              </a:defRPr>
+            </a:lvl8pPr>
+            <a:lvl9pPr marL="3657600" algn="l" defTabSz="914400" rtl="0" eaLnBrk="1" latinLnBrk="0" hangingPunct="1">
+              <a:defRPr sz="1800" kern="1200">
+                <a:solidFill>
+                  <a:schemeClr val="lt1"/>
+                </a:solidFill>
+                <a:latin typeface="+mn-lt"/>
+                <a:ea typeface="+mn-ea"/>
+                <a:cs typeface="+mn-cs"/>
+              </a:defRPr>
+            </a:lvl9pPr>
+          </a:lstStyle>
+          <a:p>
+            <a:pPr algn="ctr"/>
+            <a:r>
+              <a:rPr lang="en-US" dirty="0" smtClean="0"/>
+              <a:t>Finish</a:t>
+            </a:r>
+            <a:endParaRPr lang="en-US" dirty="0"/>
+          </a:p>
+        </p:txBody>
+      </p:sp>
     </p:spTree>
     <p:extLst>
       <p:ext uri="{BB962C8B-B14F-4D97-AF65-F5344CB8AC3E}">

</xml_diff>